<commit_message>
ppt - 10 slide
</commit_message>
<xml_diff>
--- a/powerpoint/ATVBMHTTT.pptx
+++ b/powerpoint/ATVBMHTTT.pptx
@@ -7,9 +7,14 @@
   <p:sldIdLst>
     <p:sldId id="256" r:id="rId2"/>
     <p:sldId id="257" r:id="rId3"/>
-    <p:sldId id="258" r:id="rId4"/>
-    <p:sldId id="259" r:id="rId5"/>
-    <p:sldId id="260" r:id="rId6"/>
+    <p:sldId id="262" r:id="rId4"/>
+    <p:sldId id="258" r:id="rId5"/>
+    <p:sldId id="259" r:id="rId6"/>
+    <p:sldId id="260" r:id="rId7"/>
+    <p:sldId id="261" r:id="rId8"/>
+    <p:sldId id="263" r:id="rId9"/>
+    <p:sldId id="264" r:id="rId10"/>
+    <p:sldId id="265" r:id="rId11"/>
   </p:sldIdLst>
   <p:sldSz cx="9144000" cy="6858000" type="screen4x3"/>
   <p:notesSz cx="6858000" cy="9144000"/>
@@ -4001,6 +4006,58 @@
 </p:sld>
 </file>
 
+<file path=ppt/slides/slide10.xml><?xml version="1.0" encoding="utf-8"?>
+<p:sld xmlns:a="http://schemas.openxmlformats.org/drawingml/2006/main" xmlns:r="http://schemas.openxmlformats.org/officeDocument/2006/relationships" xmlns:p="http://schemas.openxmlformats.org/presentationml/2006/main">
+  <p:cSld>
+    <p:spTree>
+      <p:nvGrpSpPr>
+        <p:cNvPr id="1" name=""/>
+        <p:cNvGrpSpPr/>
+        <p:nvPr/>
+      </p:nvGrpSpPr>
+      <p:grpSpPr>
+        <a:xfrm>
+          <a:off x="0" y="0"/>
+          <a:ext cx="0" cy="0"/>
+          <a:chOff x="0" y="0"/>
+          <a:chExt cx="0" cy="0"/>
+        </a:xfrm>
+      </p:grpSpPr>
+      <p:sp>
+        <p:nvSpPr>
+          <p:cNvPr id="2" name="Content Placeholder 1"/>
+          <p:cNvSpPr>
+            <a:spLocks noGrp="1"/>
+          </p:cNvSpPr>
+          <p:nvPr>
+            <p:ph idx="1"/>
+          </p:nvPr>
+        </p:nvSpPr>
+        <p:spPr>
+          <a:xfrm>
+            <a:off x="457200" y="533400"/>
+            <a:ext cx="8229600" cy="5562600"/>
+          </a:xfrm>
+        </p:spPr>
+        <p:txBody>
+          <a:bodyPr/>
+          <a:lstStyle/>
+          <a:p>
+            <a:pPr>
+              <a:buNone/>
+            </a:pPr>
+            <a:endParaRPr lang="en-US" dirty="0"/>
+          </a:p>
+        </p:txBody>
+      </p:sp>
+    </p:spTree>
+  </p:cSld>
+  <p:clrMapOvr>
+    <a:masterClrMapping/>
+  </p:clrMapOvr>
+</p:sld>
+</file>
+
 <file path=ppt/slides/slide2.xml><?xml version="1.0" encoding="utf-8"?>
 <p:sld xmlns:a="http://schemas.openxmlformats.org/drawingml/2006/main" xmlns:r="http://schemas.openxmlformats.org/officeDocument/2006/relationships" xmlns:p="http://schemas.openxmlformats.org/presentationml/2006/main">
   <p:cSld>
@@ -4184,284 +4241,41 @@
       </p:grpSpPr>
       <p:sp>
         <p:nvSpPr>
-          <p:cNvPr id="2" name="Content Placeholder 1"/>
-          <p:cNvSpPr>
-            <a:spLocks noGrp="1"/>
-          </p:cNvSpPr>
-          <p:nvPr>
-            <p:ph idx="1"/>
-          </p:nvPr>
-        </p:nvSpPr>
-        <p:spPr/>
-        <p:txBody>
-          <a:bodyPr>
-            <a:normAutofit/>
-          </a:bodyPr>
-          <a:lstStyle/>
-          <a:p>
-            <a:pPr marL="796925" lvl="1" indent="-369888">
-              <a:buFont typeface="Arial" pitchFamily="34" charset="0"/>
-              <a:buChar char="-"/>
-            </a:pPr>
+          <p:cNvPr id="3" name="Title 2"/>
+          <p:cNvSpPr>
+            <a:spLocks noGrp="1"/>
+          </p:cNvSpPr>
+          <p:nvPr>
+            <p:ph type="title"/>
+          </p:nvPr>
+        </p:nvSpPr>
+        <p:spPr>
+          <a:xfrm>
+            <a:off x="457200" y="2667000"/>
+            <a:ext cx="8229600" cy="1219200"/>
+          </a:xfrm>
+        </p:spPr>
+        <p:txBody>
+          <a:bodyPr anchor="ctr"/>
+          <a:lstStyle/>
+          <a:p>
+            <a:pPr algn="ctr"/>
             <a:r>
               <a:rPr lang="en-US" dirty="0" smtClean="0">
-                <a:latin typeface="Arial" pitchFamily="34" charset="0"/>
-                <a:cs typeface="Arial" pitchFamily="34" charset="0"/>
+                <a:solidFill>
+                  <a:srgbClr val="FF0000"/>
+                </a:solidFill>
               </a:rPr>
-              <a:t>Trong mọi lĩnh vực kinh tế, chính trị quân sự,...</a:t>
-            </a:r>
-            <a:r>
-              <a:rPr lang="en-US" dirty="0" smtClean="0">
-                <a:latin typeface="Arial" pitchFamily="34" charset="0"/>
-                <a:cs typeface="Arial" pitchFamily="34" charset="0"/>
-              </a:rPr>
-              <a:t> </a:t>
-            </a:r>
-            <a:r>
-              <a:rPr lang="en-US" dirty="0" smtClean="0">
-                <a:latin typeface="Arial" pitchFamily="34" charset="0"/>
-                <a:cs typeface="Arial" pitchFamily="34" charset="0"/>
-              </a:rPr>
-              <a:t>luôn có nhu cầu trao đổi thông tin giữa các cá nhân, các công ty, tổ chức hoặc giữa các quốc gia với nhau. Ngày nay, với sự phát triển công nghệ thông tin đặc biệt là mạng internet thì việc truyền tải thông tin đã dễ dàng và nhanh chóng hơn.</a:t>
+              <a:t>GIỚI THIỆU CHUNG</a:t>
             </a:r>
             <a:endParaRPr lang="en-US" dirty="0">
-              <a:latin typeface="Arial" pitchFamily="34" charset="0"/>
-              <a:cs typeface="Arial" pitchFamily="34" charset="0"/>
+              <a:solidFill>
+                <a:srgbClr val="FF0000"/>
+              </a:solidFill>
             </a:endParaRPr>
           </a:p>
         </p:txBody>
       </p:sp>
-      <p:sp>
-        <p:nvSpPr>
-          <p:cNvPr id="3" name="Title 2"/>
-          <p:cNvSpPr>
-            <a:spLocks noGrp="1"/>
-          </p:cNvSpPr>
-          <p:nvPr>
-            <p:ph type="title"/>
-          </p:nvPr>
-        </p:nvSpPr>
-        <p:spPr/>
-        <p:txBody>
-          <a:bodyPr/>
-          <a:lstStyle/>
-          <a:p>
-            <a:r>
-              <a:rPr lang="en-US" dirty="0" smtClean="0"/>
-              <a:t>Giới </a:t>
-            </a:r>
-            <a:r>
-              <a:rPr lang="en-US" dirty="0" smtClean="0"/>
-              <a:t>thiệu chung</a:t>
-            </a:r>
-            <a:endParaRPr lang="en-US" dirty="0"/>
-          </a:p>
-        </p:txBody>
-      </p:sp>
-      <p:sp>
-        <p:nvSpPr>
-          <p:cNvPr id="4" name="Rectangle 3"/>
-          <p:cNvSpPr/>
-          <p:nvPr/>
-        </p:nvSpPr>
-        <p:spPr>
-          <a:xfrm>
-            <a:off x="6019800" y="4572000"/>
-            <a:ext cx="2286000" cy="762000"/>
-          </a:xfrm>
-          <a:prstGeom prst="rect">
-            <a:avLst/>
-          </a:prstGeom>
-        </p:spPr>
-        <p:style>
-          <a:lnRef idx="2">
-            <a:schemeClr val="accent1">
-              <a:shade val="50000"/>
-            </a:schemeClr>
-          </a:lnRef>
-          <a:fillRef idx="1">
-            <a:schemeClr val="accent1"/>
-          </a:fillRef>
-          <a:effectRef idx="0">
-            <a:schemeClr val="accent1"/>
-          </a:effectRef>
-          <a:fontRef idx="minor">
-            <a:schemeClr val="lt1"/>
-          </a:fontRef>
-        </p:style>
-        <p:txBody>
-          <a:bodyPr rtlCol="0" anchor="ctr"/>
-          <a:lstStyle/>
-          <a:p>
-            <a:pPr algn="ctr"/>
-            <a:r>
-              <a:rPr lang="en-US" dirty="0" smtClean="0"/>
-              <a:t>Ông B nhận thông tin từ ông A</a:t>
-            </a:r>
-            <a:endParaRPr lang="en-US" dirty="0"/>
-          </a:p>
-        </p:txBody>
-      </p:sp>
-      <p:sp>
-        <p:nvSpPr>
-          <p:cNvPr id="5" name="7-Point Star 4"/>
-          <p:cNvSpPr/>
-          <p:nvPr/>
-        </p:nvSpPr>
-        <p:spPr>
-          <a:xfrm>
-            <a:off x="3657600" y="4419600"/>
-            <a:ext cx="1905000" cy="914400"/>
-          </a:xfrm>
-          <a:prstGeom prst="star7">
-            <a:avLst/>
-          </a:prstGeom>
-        </p:spPr>
-        <p:style>
-          <a:lnRef idx="2">
-            <a:schemeClr val="accent1">
-              <a:shade val="50000"/>
-            </a:schemeClr>
-          </a:lnRef>
-          <a:fillRef idx="1">
-            <a:schemeClr val="accent1"/>
-          </a:fillRef>
-          <a:effectRef idx="0">
-            <a:schemeClr val="accent1"/>
-          </a:effectRef>
-          <a:fontRef idx="minor">
-            <a:schemeClr val="lt1"/>
-          </a:fontRef>
-        </p:style>
-        <p:txBody>
-          <a:bodyPr rtlCol="0" anchor="ctr"/>
-          <a:lstStyle/>
-          <a:p>
-            <a:pPr algn="ctr"/>
-            <a:r>
-              <a:rPr lang="en-US" dirty="0" smtClean="0"/>
-              <a:t>Internet</a:t>
-            </a:r>
-            <a:endParaRPr lang="en-US" dirty="0"/>
-          </a:p>
-        </p:txBody>
-      </p:sp>
-      <p:sp>
-        <p:nvSpPr>
-          <p:cNvPr id="6" name="Rectangle 5"/>
-          <p:cNvSpPr/>
-          <p:nvPr/>
-        </p:nvSpPr>
-        <p:spPr>
-          <a:xfrm>
-            <a:off x="1219200" y="4648200"/>
-            <a:ext cx="1981200" cy="762000"/>
-          </a:xfrm>
-          <a:prstGeom prst="rect">
-            <a:avLst/>
-          </a:prstGeom>
-        </p:spPr>
-        <p:style>
-          <a:lnRef idx="2">
-            <a:schemeClr val="accent1">
-              <a:shade val="50000"/>
-            </a:schemeClr>
-          </a:lnRef>
-          <a:fillRef idx="1">
-            <a:schemeClr val="accent1"/>
-          </a:fillRef>
-          <a:effectRef idx="0">
-            <a:schemeClr val="accent1"/>
-          </a:effectRef>
-          <a:fontRef idx="minor">
-            <a:schemeClr val="lt1"/>
-          </a:fontRef>
-        </p:style>
-        <p:txBody>
-          <a:bodyPr rtlCol="0" anchor="ctr"/>
-          <a:lstStyle/>
-          <a:p>
-            <a:pPr algn="ctr"/>
-            <a:r>
-              <a:rPr lang="en-US" dirty="0" smtClean="0"/>
-              <a:t>Thông tin ông A cần gửi đi</a:t>
-            </a:r>
-            <a:endParaRPr lang="en-US" dirty="0"/>
-          </a:p>
-        </p:txBody>
-      </p:sp>
-      <p:cxnSp>
-        <p:nvCxnSpPr>
-          <p:cNvPr id="8" name="Straight Arrow Connector 7"/>
-          <p:cNvCxnSpPr>
-            <a:stCxn id="6" idx="3"/>
-            <a:endCxn id="5" idx="4"/>
-          </p:cNvCxnSpPr>
-          <p:nvPr/>
-        </p:nvCxnSpPr>
-        <p:spPr>
-          <a:xfrm flipV="1">
-            <a:off x="3200400" y="5007657"/>
-            <a:ext cx="457195" cy="21543"/>
-          </a:xfrm>
-          <a:prstGeom prst="straightConnector1">
-            <a:avLst/>
-          </a:prstGeom>
-          <a:ln>
-            <a:tailEnd type="arrow"/>
-          </a:ln>
-        </p:spPr>
-        <p:style>
-          <a:lnRef idx="2">
-            <a:schemeClr val="accent2"/>
-          </a:lnRef>
-          <a:fillRef idx="0">
-            <a:schemeClr val="accent2"/>
-          </a:fillRef>
-          <a:effectRef idx="1">
-            <a:schemeClr val="accent2"/>
-          </a:effectRef>
-          <a:fontRef idx="minor">
-            <a:schemeClr val="tx1"/>
-          </a:fontRef>
-        </p:style>
-      </p:cxnSp>
-      <p:cxnSp>
-        <p:nvCxnSpPr>
-          <p:cNvPr id="16" name="Straight Arrow Connector 15"/>
-          <p:cNvCxnSpPr>
-            <a:stCxn id="5" idx="1"/>
-            <a:endCxn id="4" idx="1"/>
-          </p:cNvCxnSpPr>
-          <p:nvPr/>
-        </p:nvCxnSpPr>
-        <p:spPr>
-          <a:xfrm flipV="1">
-            <a:off x="5562605" y="4953000"/>
-            <a:ext cx="457195" cy="54657"/>
-          </a:xfrm>
-          <a:prstGeom prst="straightConnector1">
-            <a:avLst/>
-          </a:prstGeom>
-          <a:ln>
-            <a:tailEnd type="arrow"/>
-          </a:ln>
-        </p:spPr>
-        <p:style>
-          <a:lnRef idx="2">
-            <a:schemeClr val="accent2"/>
-          </a:lnRef>
-          <a:fillRef idx="0">
-            <a:schemeClr val="accent2"/>
-          </a:fillRef>
-          <a:effectRef idx="1">
-            <a:schemeClr val="accent2"/>
-          </a:effectRef>
-          <a:fontRef idx="minor">
-            <a:schemeClr val="tx1"/>
-          </a:fontRef>
-        </p:style>
-      </p:cxnSp>
     </p:spTree>
   </p:cSld>
   <p:clrMapOvr>
@@ -4504,6 +4318,300 @@
             <p:ph idx="1"/>
           </p:nvPr>
         </p:nvSpPr>
+        <p:spPr/>
+        <p:txBody>
+          <a:bodyPr>
+            <a:normAutofit/>
+          </a:bodyPr>
+          <a:lstStyle/>
+          <a:p>
+            <a:pPr marL="796925" lvl="1" indent="-369888">
+              <a:buFont typeface="Arial" pitchFamily="34" charset="0"/>
+              <a:buChar char="-"/>
+            </a:pPr>
+            <a:r>
+              <a:rPr lang="en-US" dirty="0" smtClean="0">
+                <a:latin typeface="Arial" pitchFamily="34" charset="0"/>
+                <a:cs typeface="Arial" pitchFamily="34" charset="0"/>
+              </a:rPr>
+              <a:t>Trong mọi lĩnh vực kinh tế, chính trị quân sự,... luôn có nhu cầu trao đổi thông tin giữa các cá nhân, các công ty, tổ chức hoặc giữa các quốc gia với nhau. Ngày nay, với sự phát triển công nghệ thông tin đặc biệt là mạng internet thì việc truyền tải thông tin đã dễ dàng và nhanh chóng hơn.</a:t>
+            </a:r>
+            <a:endParaRPr lang="en-US" dirty="0">
+              <a:latin typeface="Arial" pitchFamily="34" charset="0"/>
+              <a:cs typeface="Arial" pitchFamily="34" charset="0"/>
+            </a:endParaRPr>
+          </a:p>
+        </p:txBody>
+      </p:sp>
+      <p:sp>
+        <p:nvSpPr>
+          <p:cNvPr id="3" name="Title 2"/>
+          <p:cNvSpPr>
+            <a:spLocks noGrp="1"/>
+          </p:cNvSpPr>
+          <p:nvPr>
+            <p:ph type="title"/>
+          </p:nvPr>
+        </p:nvSpPr>
+        <p:spPr/>
+        <p:txBody>
+          <a:bodyPr/>
+          <a:lstStyle/>
+          <a:p>
+            <a:r>
+              <a:rPr lang="en-US" dirty="0" smtClean="0"/>
+              <a:t>Giới thiệu chung</a:t>
+            </a:r>
+            <a:endParaRPr lang="en-US" dirty="0"/>
+          </a:p>
+        </p:txBody>
+      </p:sp>
+      <p:sp>
+        <p:nvSpPr>
+          <p:cNvPr id="4" name="Rectangle 3"/>
+          <p:cNvSpPr/>
+          <p:nvPr/>
+        </p:nvSpPr>
+        <p:spPr>
+          <a:xfrm>
+            <a:off x="6019800" y="4572000"/>
+            <a:ext cx="2286000" cy="762000"/>
+          </a:xfrm>
+          <a:prstGeom prst="rect">
+            <a:avLst/>
+          </a:prstGeom>
+        </p:spPr>
+        <p:style>
+          <a:lnRef idx="2">
+            <a:schemeClr val="accent1">
+              <a:shade val="50000"/>
+            </a:schemeClr>
+          </a:lnRef>
+          <a:fillRef idx="1">
+            <a:schemeClr val="accent1"/>
+          </a:fillRef>
+          <a:effectRef idx="0">
+            <a:schemeClr val="accent1"/>
+          </a:effectRef>
+          <a:fontRef idx="minor">
+            <a:schemeClr val="lt1"/>
+          </a:fontRef>
+        </p:style>
+        <p:txBody>
+          <a:bodyPr rtlCol="0" anchor="ctr"/>
+          <a:lstStyle/>
+          <a:p>
+            <a:pPr algn="ctr"/>
+            <a:r>
+              <a:rPr lang="en-US" dirty="0" smtClean="0"/>
+              <a:t>Ông B nhận thông tin từ ông A</a:t>
+            </a:r>
+            <a:endParaRPr lang="en-US" dirty="0"/>
+          </a:p>
+        </p:txBody>
+      </p:sp>
+      <p:sp>
+        <p:nvSpPr>
+          <p:cNvPr id="5" name="7-Point Star 4"/>
+          <p:cNvSpPr/>
+          <p:nvPr/>
+        </p:nvSpPr>
+        <p:spPr>
+          <a:xfrm>
+            <a:off x="3657600" y="4419600"/>
+            <a:ext cx="1905000" cy="914400"/>
+          </a:xfrm>
+          <a:prstGeom prst="star7">
+            <a:avLst/>
+          </a:prstGeom>
+        </p:spPr>
+        <p:style>
+          <a:lnRef idx="2">
+            <a:schemeClr val="accent1">
+              <a:shade val="50000"/>
+            </a:schemeClr>
+          </a:lnRef>
+          <a:fillRef idx="1">
+            <a:schemeClr val="accent1"/>
+          </a:fillRef>
+          <a:effectRef idx="0">
+            <a:schemeClr val="accent1"/>
+          </a:effectRef>
+          <a:fontRef idx="minor">
+            <a:schemeClr val="lt1"/>
+          </a:fontRef>
+        </p:style>
+        <p:txBody>
+          <a:bodyPr rtlCol="0" anchor="ctr"/>
+          <a:lstStyle/>
+          <a:p>
+            <a:pPr algn="ctr"/>
+            <a:r>
+              <a:rPr lang="en-US" dirty="0" smtClean="0"/>
+              <a:t>Internet</a:t>
+            </a:r>
+            <a:endParaRPr lang="en-US" dirty="0"/>
+          </a:p>
+        </p:txBody>
+      </p:sp>
+      <p:sp>
+        <p:nvSpPr>
+          <p:cNvPr id="6" name="Rectangle 5"/>
+          <p:cNvSpPr/>
+          <p:nvPr/>
+        </p:nvSpPr>
+        <p:spPr>
+          <a:xfrm>
+            <a:off x="1219200" y="4648200"/>
+            <a:ext cx="1981200" cy="762000"/>
+          </a:xfrm>
+          <a:prstGeom prst="rect">
+            <a:avLst/>
+          </a:prstGeom>
+        </p:spPr>
+        <p:style>
+          <a:lnRef idx="2">
+            <a:schemeClr val="accent1">
+              <a:shade val="50000"/>
+            </a:schemeClr>
+          </a:lnRef>
+          <a:fillRef idx="1">
+            <a:schemeClr val="accent1"/>
+          </a:fillRef>
+          <a:effectRef idx="0">
+            <a:schemeClr val="accent1"/>
+          </a:effectRef>
+          <a:fontRef idx="minor">
+            <a:schemeClr val="lt1"/>
+          </a:fontRef>
+        </p:style>
+        <p:txBody>
+          <a:bodyPr rtlCol="0" anchor="ctr"/>
+          <a:lstStyle/>
+          <a:p>
+            <a:pPr algn="ctr"/>
+            <a:r>
+              <a:rPr lang="en-US" dirty="0" smtClean="0"/>
+              <a:t>Thông tin ông A cần gửi đi</a:t>
+            </a:r>
+            <a:endParaRPr lang="en-US" dirty="0"/>
+          </a:p>
+        </p:txBody>
+      </p:sp>
+      <p:cxnSp>
+        <p:nvCxnSpPr>
+          <p:cNvPr id="8" name="Straight Arrow Connector 7"/>
+          <p:cNvCxnSpPr>
+            <a:stCxn id="6" idx="3"/>
+            <a:endCxn id="5" idx="4"/>
+          </p:cNvCxnSpPr>
+          <p:nvPr/>
+        </p:nvCxnSpPr>
+        <p:spPr>
+          <a:xfrm flipV="1">
+            <a:off x="3200400" y="5007657"/>
+            <a:ext cx="457195" cy="21543"/>
+          </a:xfrm>
+          <a:prstGeom prst="straightConnector1">
+            <a:avLst/>
+          </a:prstGeom>
+          <a:ln>
+            <a:tailEnd type="arrow"/>
+          </a:ln>
+        </p:spPr>
+        <p:style>
+          <a:lnRef idx="2">
+            <a:schemeClr val="accent2"/>
+          </a:lnRef>
+          <a:fillRef idx="0">
+            <a:schemeClr val="accent2"/>
+          </a:fillRef>
+          <a:effectRef idx="1">
+            <a:schemeClr val="accent2"/>
+          </a:effectRef>
+          <a:fontRef idx="minor">
+            <a:schemeClr val="tx1"/>
+          </a:fontRef>
+        </p:style>
+      </p:cxnSp>
+      <p:cxnSp>
+        <p:nvCxnSpPr>
+          <p:cNvPr id="16" name="Straight Arrow Connector 15"/>
+          <p:cNvCxnSpPr>
+            <a:stCxn id="5" idx="1"/>
+            <a:endCxn id="4" idx="1"/>
+          </p:cNvCxnSpPr>
+          <p:nvPr/>
+        </p:nvCxnSpPr>
+        <p:spPr>
+          <a:xfrm flipV="1">
+            <a:off x="5562605" y="4953000"/>
+            <a:ext cx="457195" cy="54657"/>
+          </a:xfrm>
+          <a:prstGeom prst="straightConnector1">
+            <a:avLst/>
+          </a:prstGeom>
+          <a:ln>
+            <a:tailEnd type="arrow"/>
+          </a:ln>
+        </p:spPr>
+        <p:style>
+          <a:lnRef idx="2">
+            <a:schemeClr val="accent2"/>
+          </a:lnRef>
+          <a:fillRef idx="0">
+            <a:schemeClr val="accent2"/>
+          </a:fillRef>
+          <a:effectRef idx="1">
+            <a:schemeClr val="accent2"/>
+          </a:effectRef>
+          <a:fontRef idx="minor">
+            <a:schemeClr val="tx1"/>
+          </a:fontRef>
+        </p:style>
+      </p:cxnSp>
+    </p:spTree>
+  </p:cSld>
+  <p:clrMapOvr>
+    <a:masterClrMapping/>
+  </p:clrMapOvr>
+  <p:timing>
+    <p:tnLst>
+      <p:par>
+        <p:cTn id="1" dur="indefinite" restart="never" nodeType="tmRoot"/>
+      </p:par>
+    </p:tnLst>
+  </p:timing>
+</p:sld>
+</file>
+
+<file path=ppt/slides/slide5.xml><?xml version="1.0" encoding="utf-8"?>
+<p:sld xmlns:a="http://schemas.openxmlformats.org/drawingml/2006/main" xmlns:r="http://schemas.openxmlformats.org/officeDocument/2006/relationships" xmlns:p="http://schemas.openxmlformats.org/presentationml/2006/main">
+  <p:cSld>
+    <p:spTree>
+      <p:nvGrpSpPr>
+        <p:cNvPr id="1" name=""/>
+        <p:cNvGrpSpPr/>
+        <p:nvPr/>
+      </p:nvGrpSpPr>
+      <p:grpSpPr>
+        <a:xfrm>
+          <a:off x="0" y="0"/>
+          <a:ext cx="0" cy="0"/>
+          <a:chOff x="0" y="0"/>
+          <a:chExt cx="0" cy="0"/>
+        </a:xfrm>
+      </p:grpSpPr>
+      <p:sp>
+        <p:nvSpPr>
+          <p:cNvPr id="2" name="Content Placeholder 1"/>
+          <p:cNvSpPr>
+            <a:spLocks noGrp="1"/>
+          </p:cNvSpPr>
+          <p:nvPr>
+            <p:ph idx="1"/>
+          </p:nvPr>
+        </p:nvSpPr>
         <p:spPr>
           <a:xfrm>
             <a:off x="457200" y="533400"/>
@@ -4897,10 +5005,17 @@
   <p:clrMapOvr>
     <a:masterClrMapping/>
   </p:clrMapOvr>
+  <p:timing>
+    <p:tnLst>
+      <p:par>
+        <p:cTn id="1" dur="indefinite" restart="never" nodeType="tmRoot"/>
+      </p:par>
+    </p:tnLst>
+  </p:timing>
 </p:sld>
 </file>
 
-<file path=ppt/slides/slide5.xml><?xml version="1.0" encoding="utf-8"?>
+<file path=ppt/slides/slide6.xml><?xml version="1.0" encoding="utf-8"?>
 <p:sld xmlns:a="http://schemas.openxmlformats.org/drawingml/2006/main" xmlns:r="http://schemas.openxmlformats.org/officeDocument/2006/relationships" xmlns:p="http://schemas.openxmlformats.org/presentationml/2006/main">
   <p:cSld>
     <p:spTree>
@@ -4927,34 +5042,892 @@
             <p:ph idx="1"/>
           </p:nvPr>
         </p:nvSpPr>
+        <p:spPr>
+          <a:xfrm>
+            <a:off x="457200" y="533400"/>
+            <a:ext cx="8229600" cy="5562600"/>
+          </a:xfrm>
+        </p:spPr>
+        <p:txBody>
+          <a:bodyPr>
+            <a:normAutofit lnSpcReduction="10000"/>
+          </a:bodyPr>
+          <a:lstStyle/>
+          <a:p>
+            <a:pPr marL="738188" lvl="1" indent="-371475">
+              <a:buFont typeface="Arial" pitchFamily="34" charset="0"/>
+              <a:buChar char="-"/>
+            </a:pPr>
+            <a:r>
+              <a:rPr lang="en-US" dirty="0" smtClean="0">
+                <a:latin typeface="Arial" pitchFamily="34" charset="0"/>
+                <a:cs typeface="Arial" pitchFamily="34" charset="0"/>
+              </a:rPr>
+              <a:t>Với sự phát triển vượt bậc trong ngành khoa học mật mã hiện nay, có rất nhiều hệ mã hóa ra đời đánh dấu cho bước đột phá trong việc bảo mật cho hệ thống thông tin. </a:t>
+            </a:r>
+            <a:r>
+              <a:rPr lang="en-US" dirty="0" smtClean="0">
+                <a:latin typeface="Arial" pitchFamily="34" charset="0"/>
+                <a:cs typeface="Arial" pitchFamily="34" charset="0"/>
+              </a:rPr>
+              <a:t>Tuy nhiều như thế nhưng hệ mã hóa được chia thành 2 loại chính:</a:t>
+            </a:r>
+          </a:p>
+          <a:p>
+            <a:pPr marL="1195388" lvl="2" indent="-463550">
+              <a:buFont typeface="Arial" pitchFamily="34" charset="0"/>
+              <a:buChar char="•"/>
+            </a:pPr>
+            <a:r>
+              <a:rPr lang="en-US" sz="2400" dirty="0" smtClean="0">
+                <a:latin typeface="Arial" pitchFamily="34" charset="0"/>
+                <a:cs typeface="Arial" pitchFamily="34" charset="0"/>
+              </a:rPr>
+              <a:t>Hệ mã hóa đối xứng</a:t>
+            </a:r>
+          </a:p>
+          <a:p>
+            <a:pPr marL="1195388" lvl="2" indent="-463550">
+              <a:buFont typeface="Arial" pitchFamily="34" charset="0"/>
+              <a:buChar char="•"/>
+            </a:pPr>
+            <a:r>
+              <a:rPr lang="en-US" sz="2400" dirty="0" smtClean="0">
+                <a:latin typeface="Arial" pitchFamily="34" charset="0"/>
+                <a:cs typeface="Arial" pitchFamily="34" charset="0"/>
+              </a:rPr>
+              <a:t>Hệ mã hóa bất đối xứng (hay còn gọi là hệ mã hóa công khai)</a:t>
+            </a:r>
+            <a:endParaRPr lang="en-US" sz="2400" dirty="0" smtClean="0">
+              <a:latin typeface="Arial" pitchFamily="34" charset="0"/>
+              <a:cs typeface="Arial" pitchFamily="34" charset="0"/>
+            </a:endParaRPr>
+          </a:p>
+          <a:p>
+            <a:pPr marL="693738" lvl="2" indent="-463550">
+              <a:buFont typeface="Arial" pitchFamily="34" charset="0"/>
+              <a:buChar char="-"/>
+            </a:pPr>
+            <a:r>
+              <a:rPr lang="en-US" sz="2400" dirty="0" smtClean="0">
+                <a:latin typeface="Arial" pitchFamily="34" charset="0"/>
+                <a:cs typeface="Arial" pitchFamily="34" charset="0"/>
+              </a:rPr>
+              <a:t>Trong đề tài này chúng ta sẽ tìm hiểu về hệ mã hóa công khai, đây là loại mã hóa hiện đại, dữ liệu được mã hóa khó có thể bị giải mã bởi bên thứ 3, đảm bảo tính bí mật và toàn vẹn của dữ liệu. Được ứng dụng rộng rãi trong giao dịch điện tử như bitcoin, giao dịch ngân hàng... </a:t>
+            </a:r>
+            <a:r>
+              <a:rPr lang="en-US" sz="2400" dirty="0" smtClean="0">
+                <a:latin typeface="Arial" pitchFamily="34" charset="0"/>
+                <a:cs typeface="Arial" pitchFamily="34" charset="0"/>
+              </a:rPr>
+              <a:t>v</a:t>
+            </a:r>
+            <a:r>
+              <a:rPr lang="en-US" sz="2400" dirty="0" smtClean="0">
+                <a:latin typeface="Arial" pitchFamily="34" charset="0"/>
+                <a:cs typeface="Arial" pitchFamily="34" charset="0"/>
+              </a:rPr>
+              <a:t>à là nền tảng của kĩ thuật chữ kí điện tử, hệ thông PKI...</a:t>
+            </a:r>
+            <a:endParaRPr lang="en-US" sz="2400" dirty="0">
+              <a:latin typeface="Arial" pitchFamily="34" charset="0"/>
+              <a:cs typeface="Arial" pitchFamily="34" charset="0"/>
+            </a:endParaRPr>
+          </a:p>
+        </p:txBody>
+      </p:sp>
+    </p:spTree>
+  </p:cSld>
+  <p:clrMapOvr>
+    <a:masterClrMapping/>
+  </p:clrMapOvr>
+  <p:timing>
+    <p:tnLst>
+      <p:par>
+        <p:cTn id="1" dur="indefinite" restart="never" nodeType="tmRoot"/>
+      </p:par>
+    </p:tnLst>
+  </p:timing>
+</p:sld>
+</file>
+
+<file path=ppt/slides/slide7.xml><?xml version="1.0" encoding="utf-8"?>
+<p:sld xmlns:a="http://schemas.openxmlformats.org/drawingml/2006/main" xmlns:r="http://schemas.openxmlformats.org/officeDocument/2006/relationships" xmlns:p="http://schemas.openxmlformats.org/presentationml/2006/main">
+  <p:cSld>
+    <p:spTree>
+      <p:nvGrpSpPr>
+        <p:cNvPr id="1" name=""/>
+        <p:cNvGrpSpPr/>
+        <p:nvPr/>
+      </p:nvGrpSpPr>
+      <p:grpSpPr>
+        <a:xfrm>
+          <a:off x="0" y="0"/>
+          <a:ext cx="0" cy="0"/>
+          <a:chOff x="0" y="0"/>
+          <a:chExt cx="0" cy="0"/>
+        </a:xfrm>
+      </p:grpSpPr>
+      <p:sp>
+        <p:nvSpPr>
+          <p:cNvPr id="3" name="Title 2"/>
+          <p:cNvSpPr>
+            <a:spLocks noGrp="1"/>
+          </p:cNvSpPr>
+          <p:nvPr>
+            <p:ph type="title"/>
+          </p:nvPr>
+        </p:nvSpPr>
+        <p:spPr>
+          <a:xfrm>
+            <a:off x="457200" y="2590800"/>
+            <a:ext cx="8229600" cy="1219200"/>
+          </a:xfrm>
+        </p:spPr>
+        <p:txBody>
+          <a:bodyPr anchor="ctr"/>
+          <a:lstStyle/>
+          <a:p>
+            <a:pPr algn="ctr"/>
+            <a:r>
+              <a:rPr lang="en-US" dirty="0" smtClean="0">
+                <a:solidFill>
+                  <a:srgbClr val="FF0000"/>
+                </a:solidFill>
+              </a:rPr>
+              <a:t>HỆ MÃ HÓA CÔNG KHAI</a:t>
+            </a:r>
+            <a:endParaRPr lang="en-US" dirty="0">
+              <a:solidFill>
+                <a:srgbClr val="FF0000"/>
+              </a:solidFill>
+            </a:endParaRPr>
+          </a:p>
+        </p:txBody>
+      </p:sp>
+    </p:spTree>
+  </p:cSld>
+  <p:clrMapOvr>
+    <a:masterClrMapping/>
+  </p:clrMapOvr>
+  <p:timing>
+    <p:tnLst>
+      <p:par>
+        <p:cTn id="1" dur="indefinite" restart="never" nodeType="tmRoot"/>
+      </p:par>
+    </p:tnLst>
+  </p:timing>
+</p:sld>
+</file>
+
+<file path=ppt/slides/slide8.xml><?xml version="1.0" encoding="utf-8"?>
+<p:sld xmlns:a="http://schemas.openxmlformats.org/drawingml/2006/main" xmlns:r="http://schemas.openxmlformats.org/officeDocument/2006/relationships" xmlns:p="http://schemas.openxmlformats.org/presentationml/2006/main">
+  <p:cSld>
+    <p:spTree>
+      <p:nvGrpSpPr>
+        <p:cNvPr id="1" name=""/>
+        <p:cNvGrpSpPr/>
+        <p:nvPr/>
+      </p:nvGrpSpPr>
+      <p:grpSpPr>
+        <a:xfrm>
+          <a:off x="0" y="0"/>
+          <a:ext cx="0" cy="0"/>
+          <a:chOff x="0" y="0"/>
+          <a:chExt cx="0" cy="0"/>
+        </a:xfrm>
+      </p:grpSpPr>
+      <p:sp>
+        <p:nvSpPr>
+          <p:cNvPr id="2" name="Content Placeholder 1"/>
+          <p:cNvSpPr>
+            <a:spLocks noGrp="1"/>
+          </p:cNvSpPr>
+          <p:nvPr>
+            <p:ph idx="1"/>
+          </p:nvPr>
+        </p:nvSpPr>
         <p:spPr/>
         <p:txBody>
+          <a:bodyPr>
+            <a:normAutofit/>
+          </a:bodyPr>
+          <a:lstStyle/>
+          <a:p>
+            <a:pPr marL="880110" lvl="1" indent="-514350">
+              <a:buFont typeface="+mj-lt"/>
+              <a:buAutoNum type="arabicPeriod"/>
+            </a:pPr>
+            <a:r>
+              <a:rPr lang="en-US" dirty="0" smtClean="0">
+                <a:solidFill>
+                  <a:schemeClr val="tx1"/>
+                </a:solidFill>
+                <a:latin typeface="Arial" pitchFamily="34" charset="0"/>
+                <a:cs typeface="Arial" pitchFamily="34" charset="0"/>
+              </a:rPr>
+              <a:t>L</a:t>
+            </a:r>
+            <a:r>
+              <a:rPr lang="en-US" dirty="0" smtClean="0">
+                <a:solidFill>
+                  <a:schemeClr val="tx1"/>
+                </a:solidFill>
+                <a:latin typeface="Arial" pitchFamily="34" charset="0"/>
+                <a:cs typeface="Arial" pitchFamily="34" charset="0"/>
+              </a:rPr>
+              <a:t>ịch sử ra đời</a:t>
+            </a:r>
+          </a:p>
+          <a:p>
+            <a:pPr marL="1190625" lvl="1" indent="-514350">
+              <a:buFont typeface="Arial" pitchFamily="34" charset="0"/>
+              <a:buChar char="-"/>
+            </a:pPr>
+            <a:r>
+              <a:rPr lang="en-US" sz="2000" dirty="0" smtClean="0">
+                <a:solidFill>
+                  <a:schemeClr val="tx1"/>
+                </a:solidFill>
+                <a:latin typeface="Arial" pitchFamily="34" charset="0"/>
+                <a:cs typeface="Arial" pitchFamily="34" charset="0"/>
+              </a:rPr>
+              <a:t>Vào đầu những năm 1970, giai đoạn mà thuật ngữ “Internet” xuất hiện, đang trong quá trinh hình thành và trên đà phát triển mạnh. Nhu cầu trao đổi thông tin thông qua internet ngày càng gia tăng bởi tính tiện lợi và nhanh chóng, đương nhiên các thông tin quan trọng được truyền qua internet đòi hỏi phải được đảm bảo tính bí mật và toàn vẹn. Lúc bấy giờ, theo lý thuyết thì chỉ có một loại mã hóa đảm bảo được điều này đó là mã hóa bí mật (thuộc hệ mã hóa đối xứng). Song, khi áp dụng loại mã hóa này trong môi trường internet thì nó đã phá vỡ đi các yếu tố của bảo mật thông tin.</a:t>
+            </a:r>
+          </a:p>
+          <a:p>
+            <a:pPr marL="1190625" lvl="1" indent="-514350">
+              <a:buFont typeface="Arial" pitchFamily="34" charset="0"/>
+              <a:buChar char="-"/>
+            </a:pPr>
+            <a:r>
+              <a:rPr lang="en-US" sz="2000" dirty="0" smtClean="0">
+                <a:solidFill>
+                  <a:schemeClr val="tx1"/>
+                </a:solidFill>
+                <a:latin typeface="Arial" pitchFamily="34" charset="0"/>
+                <a:cs typeface="Arial" pitchFamily="34" charset="0"/>
+              </a:rPr>
+              <a:t>Sau đây là nguyên nhân mà hệ mã hóa bí mật không đảm bảo tính bảo mật trong môi trường internet:</a:t>
+            </a:r>
+            <a:endParaRPr lang="en-US" sz="2000" dirty="0">
+              <a:solidFill>
+                <a:schemeClr val="tx1"/>
+              </a:solidFill>
+              <a:latin typeface="Arial" pitchFamily="34" charset="0"/>
+              <a:cs typeface="Arial" pitchFamily="34" charset="0"/>
+            </a:endParaRPr>
+          </a:p>
+        </p:txBody>
+      </p:sp>
+      <p:sp>
+        <p:nvSpPr>
+          <p:cNvPr id="3" name="Title 2"/>
+          <p:cNvSpPr>
+            <a:spLocks noGrp="1"/>
+          </p:cNvSpPr>
+          <p:nvPr>
+            <p:ph type="title"/>
+          </p:nvPr>
+        </p:nvSpPr>
+        <p:spPr/>
+        <p:txBody>
           <a:bodyPr/>
           <a:lstStyle/>
           <a:p>
-            <a:endParaRPr lang="en-US"/>
-          </a:p>
-        </p:txBody>
-      </p:sp>
-      <p:sp>
-        <p:nvSpPr>
-          <p:cNvPr id="3" name="Title 2"/>
-          <p:cNvSpPr>
-            <a:spLocks noGrp="1"/>
-          </p:cNvSpPr>
-          <p:nvPr>
-            <p:ph type="title"/>
-          </p:nvPr>
-        </p:nvSpPr>
-        <p:spPr/>
-        <p:txBody>
-          <a:bodyPr/>
-          <a:lstStyle/>
-          <a:p>
-            <a:endParaRPr lang="en-US"/>
-          </a:p>
-        </p:txBody>
-      </p:sp>
+            <a:r>
+              <a:rPr lang="en-US" dirty="0" smtClean="0"/>
+              <a:t>HỆ MÃ HÓA CÔNG KHAI</a:t>
+            </a:r>
+            <a:endParaRPr lang="en-US" dirty="0"/>
+          </a:p>
+        </p:txBody>
+      </p:sp>
+    </p:spTree>
+  </p:cSld>
+  <p:clrMapOvr>
+    <a:masterClrMapping/>
+  </p:clrMapOvr>
+</p:sld>
+</file>
+
+<file path=ppt/slides/slide9.xml><?xml version="1.0" encoding="utf-8"?>
+<p:sld xmlns:a="http://schemas.openxmlformats.org/drawingml/2006/main" xmlns:r="http://schemas.openxmlformats.org/officeDocument/2006/relationships" xmlns:p="http://schemas.openxmlformats.org/presentationml/2006/main">
+  <p:cSld>
+    <p:spTree>
+      <p:nvGrpSpPr>
+        <p:cNvPr id="1" name=""/>
+        <p:cNvGrpSpPr/>
+        <p:nvPr/>
+      </p:nvGrpSpPr>
+      <p:grpSpPr>
+        <a:xfrm>
+          <a:off x="0" y="0"/>
+          <a:ext cx="0" cy="0"/>
+          <a:chOff x="0" y="0"/>
+          <a:chExt cx="0" cy="0"/>
+        </a:xfrm>
+      </p:grpSpPr>
+      <p:sp>
+        <p:nvSpPr>
+          <p:cNvPr id="2" name="Content Placeholder 1"/>
+          <p:cNvSpPr>
+            <a:spLocks noGrp="1"/>
+          </p:cNvSpPr>
+          <p:nvPr>
+            <p:ph idx="1"/>
+          </p:nvPr>
+        </p:nvSpPr>
+        <p:spPr>
+          <a:xfrm>
+            <a:off x="457200" y="3505200"/>
+            <a:ext cx="8229600" cy="2743200"/>
+          </a:xfrm>
+        </p:spPr>
+        <p:txBody>
+          <a:bodyPr>
+            <a:normAutofit lnSpcReduction="10000"/>
+          </a:bodyPr>
+          <a:lstStyle/>
+          <a:p>
+            <a:pPr>
+              <a:buFont typeface="Constantia" pitchFamily="18" charset="0"/>
+              <a:buChar char="-"/>
+            </a:pPr>
+            <a:r>
+              <a:rPr lang="en-US" dirty="0" smtClean="0"/>
+              <a:t>Về nguyên tắc thì hacker dù có bắt được bản mã của ông A mà không có khóa bí mật thì cũng không thể nào giải mã bản mã để ra bản rõ được.</a:t>
+            </a:r>
+          </a:p>
+          <a:p>
+            <a:pPr>
+              <a:buFont typeface="Constantia" pitchFamily="18" charset="0"/>
+              <a:buChar char="-"/>
+            </a:pPr>
+            <a:r>
+              <a:rPr lang="en-US" dirty="0" smtClean="0"/>
+              <a:t>Vấn đề đặt ra ở đây là ông A phải chia sẻ khóa bí mật cho ông B. Nếu gửi thông qua internet thì sẽ bị bên thứ ba (hacker) bắt được khóa và lúc này thông điệp sẽ bị giải mã.</a:t>
+            </a:r>
+          </a:p>
+        </p:txBody>
+      </p:sp>
+      <p:sp>
+        <p:nvSpPr>
+          <p:cNvPr id="4" name="Rectangle 3"/>
+          <p:cNvSpPr/>
+          <p:nvPr/>
+        </p:nvSpPr>
+        <p:spPr>
+          <a:xfrm>
+            <a:off x="609600" y="457200"/>
+            <a:ext cx="1447800" cy="1447800"/>
+          </a:xfrm>
+          <a:prstGeom prst="rect">
+            <a:avLst/>
+          </a:prstGeom>
+        </p:spPr>
+        <p:style>
+          <a:lnRef idx="2">
+            <a:schemeClr val="accent1">
+              <a:shade val="50000"/>
+            </a:schemeClr>
+          </a:lnRef>
+          <a:fillRef idx="1">
+            <a:schemeClr val="accent1"/>
+          </a:fillRef>
+          <a:effectRef idx="0">
+            <a:schemeClr val="accent1"/>
+          </a:effectRef>
+          <a:fontRef idx="minor">
+            <a:schemeClr val="lt1"/>
+          </a:fontRef>
+        </p:style>
+        <p:txBody>
+          <a:bodyPr rtlCol="0" anchor="ctr"/>
+          <a:lstStyle/>
+          <a:p>
+            <a:pPr algn="ctr"/>
+            <a:r>
+              <a:rPr lang="en-US" dirty="0" smtClean="0"/>
+              <a:t>Thông điêp của ông A</a:t>
+            </a:r>
+            <a:endParaRPr lang="en-US" dirty="0"/>
+          </a:p>
+        </p:txBody>
+      </p:sp>
+      <p:sp>
+        <p:nvSpPr>
+          <p:cNvPr id="5" name="Explosion 1 4"/>
+          <p:cNvSpPr/>
+          <p:nvPr/>
+        </p:nvSpPr>
+        <p:spPr>
+          <a:xfrm>
+            <a:off x="4038600" y="457200"/>
+            <a:ext cx="1828800" cy="1371600"/>
+          </a:xfrm>
+          <a:prstGeom prst="irregularSeal1">
+            <a:avLst/>
+          </a:prstGeom>
+        </p:spPr>
+        <p:style>
+          <a:lnRef idx="2">
+            <a:schemeClr val="accent1">
+              <a:shade val="50000"/>
+            </a:schemeClr>
+          </a:lnRef>
+          <a:fillRef idx="1">
+            <a:schemeClr val="accent1"/>
+          </a:fillRef>
+          <a:effectRef idx="0">
+            <a:schemeClr val="accent1"/>
+          </a:effectRef>
+          <a:fontRef idx="minor">
+            <a:schemeClr val="lt1"/>
+          </a:fontRef>
+        </p:style>
+        <p:txBody>
+          <a:bodyPr rtlCol="0" anchor="ctr"/>
+          <a:lstStyle/>
+          <a:p>
+            <a:pPr algn="ctr"/>
+            <a:r>
+              <a:rPr lang="en-US" dirty="0" smtClean="0"/>
+              <a:t>Internet</a:t>
+            </a:r>
+            <a:endParaRPr lang="en-US" dirty="0"/>
+          </a:p>
+        </p:txBody>
+      </p:sp>
+      <p:sp>
+        <p:nvSpPr>
+          <p:cNvPr id="6" name="Rectangle 5"/>
+          <p:cNvSpPr/>
+          <p:nvPr/>
+        </p:nvSpPr>
+        <p:spPr>
+          <a:xfrm>
+            <a:off x="7620000" y="457200"/>
+            <a:ext cx="1143000" cy="1524000"/>
+          </a:xfrm>
+          <a:prstGeom prst="rect">
+            <a:avLst/>
+          </a:prstGeom>
+        </p:spPr>
+        <p:style>
+          <a:lnRef idx="2">
+            <a:schemeClr val="accent1">
+              <a:shade val="50000"/>
+            </a:schemeClr>
+          </a:lnRef>
+          <a:fillRef idx="1">
+            <a:schemeClr val="accent1"/>
+          </a:fillRef>
+          <a:effectRef idx="0">
+            <a:schemeClr val="accent1"/>
+          </a:effectRef>
+          <a:fontRef idx="minor">
+            <a:schemeClr val="lt1"/>
+          </a:fontRef>
+        </p:style>
+        <p:txBody>
+          <a:bodyPr rtlCol="0" anchor="ctr"/>
+          <a:lstStyle/>
+          <a:p>
+            <a:pPr algn="ctr"/>
+            <a:r>
+              <a:rPr lang="en-US" dirty="0" smtClean="0"/>
+              <a:t>Thông điệp nhận được từ ông A</a:t>
+            </a:r>
+            <a:endParaRPr lang="en-US" dirty="0"/>
+          </a:p>
+        </p:txBody>
+      </p:sp>
+      <p:sp>
+        <p:nvSpPr>
+          <p:cNvPr id="7" name="Rounded Rectangle 6"/>
+          <p:cNvSpPr/>
+          <p:nvPr/>
+        </p:nvSpPr>
+        <p:spPr>
+          <a:xfrm>
+            <a:off x="2438400" y="533400"/>
+            <a:ext cx="1295400" cy="1295400"/>
+          </a:xfrm>
+          <a:prstGeom prst="roundRect">
+            <a:avLst/>
+          </a:prstGeom>
+        </p:spPr>
+        <p:style>
+          <a:lnRef idx="2">
+            <a:schemeClr val="accent1">
+              <a:shade val="50000"/>
+            </a:schemeClr>
+          </a:lnRef>
+          <a:fillRef idx="1">
+            <a:schemeClr val="accent1"/>
+          </a:fillRef>
+          <a:effectRef idx="0">
+            <a:schemeClr val="accent1"/>
+          </a:effectRef>
+          <a:fontRef idx="minor">
+            <a:schemeClr val="lt1"/>
+          </a:fontRef>
+        </p:style>
+        <p:txBody>
+          <a:bodyPr rtlCol="0" anchor="ctr"/>
+          <a:lstStyle/>
+          <a:p>
+            <a:pPr algn="ctr"/>
+            <a:r>
+              <a:rPr lang="en-US" dirty="0" smtClean="0"/>
+              <a:t>Mã hóa</a:t>
+            </a:r>
+            <a:endParaRPr lang="en-US" dirty="0"/>
+          </a:p>
+        </p:txBody>
+      </p:sp>
+      <p:cxnSp>
+        <p:nvCxnSpPr>
+          <p:cNvPr id="12" name="Straight Arrow Connector 11"/>
+          <p:cNvCxnSpPr>
+            <a:stCxn id="4" idx="3"/>
+            <a:endCxn id="7" idx="1"/>
+          </p:cNvCxnSpPr>
+          <p:nvPr/>
+        </p:nvCxnSpPr>
+        <p:spPr>
+          <a:xfrm>
+            <a:off x="2057400" y="1181100"/>
+            <a:ext cx="381000" cy="0"/>
+          </a:xfrm>
+          <a:prstGeom prst="straightConnector1">
+            <a:avLst/>
+          </a:prstGeom>
+          <a:ln>
+            <a:tailEnd type="arrow"/>
+          </a:ln>
+        </p:spPr>
+        <p:style>
+          <a:lnRef idx="2">
+            <a:schemeClr val="accent2"/>
+          </a:lnRef>
+          <a:fillRef idx="0">
+            <a:schemeClr val="accent2"/>
+          </a:fillRef>
+          <a:effectRef idx="1">
+            <a:schemeClr val="accent2"/>
+          </a:effectRef>
+          <a:fontRef idx="minor">
+            <a:schemeClr val="tx1"/>
+          </a:fontRef>
+        </p:style>
+      </p:cxnSp>
+      <p:cxnSp>
+        <p:nvCxnSpPr>
+          <p:cNvPr id="16" name="Straight Arrow Connector 15"/>
+          <p:cNvCxnSpPr>
+            <a:stCxn id="7" idx="3"/>
+            <a:endCxn id="5" idx="1"/>
+          </p:cNvCxnSpPr>
+          <p:nvPr/>
+        </p:nvCxnSpPr>
+        <p:spPr>
+          <a:xfrm flipV="1">
+            <a:off x="3733800" y="1004253"/>
+            <a:ext cx="304800" cy="176847"/>
+          </a:xfrm>
+          <a:prstGeom prst="straightConnector1">
+            <a:avLst/>
+          </a:prstGeom>
+          <a:ln>
+            <a:tailEnd type="arrow"/>
+          </a:ln>
+        </p:spPr>
+        <p:style>
+          <a:lnRef idx="2">
+            <a:schemeClr val="accent2"/>
+          </a:lnRef>
+          <a:fillRef idx="0">
+            <a:schemeClr val="accent2"/>
+          </a:fillRef>
+          <a:effectRef idx="1">
+            <a:schemeClr val="accent2"/>
+          </a:effectRef>
+          <a:fontRef idx="minor">
+            <a:schemeClr val="tx1"/>
+          </a:fontRef>
+        </p:style>
+      </p:cxnSp>
+      <p:sp>
+        <p:nvSpPr>
+          <p:cNvPr id="48" name="Rounded Rectangle 47"/>
+          <p:cNvSpPr/>
+          <p:nvPr/>
+        </p:nvSpPr>
+        <p:spPr>
+          <a:xfrm>
+            <a:off x="6172200" y="533400"/>
+            <a:ext cx="1066800" cy="1295400"/>
+          </a:xfrm>
+          <a:prstGeom prst="roundRect">
+            <a:avLst/>
+          </a:prstGeom>
+        </p:spPr>
+        <p:style>
+          <a:lnRef idx="2">
+            <a:schemeClr val="accent1">
+              <a:shade val="50000"/>
+            </a:schemeClr>
+          </a:lnRef>
+          <a:fillRef idx="1">
+            <a:schemeClr val="accent1"/>
+          </a:fillRef>
+          <a:effectRef idx="0">
+            <a:schemeClr val="accent1"/>
+          </a:effectRef>
+          <a:fontRef idx="minor">
+            <a:schemeClr val="lt1"/>
+          </a:fontRef>
+        </p:style>
+        <p:txBody>
+          <a:bodyPr rtlCol="0" anchor="ctr"/>
+          <a:lstStyle/>
+          <a:p>
+            <a:pPr algn="ctr"/>
+            <a:r>
+              <a:rPr lang="en-US" dirty="0" smtClean="0"/>
+              <a:t>Giải mã</a:t>
+            </a:r>
+            <a:endParaRPr lang="en-US" dirty="0"/>
+          </a:p>
+        </p:txBody>
+      </p:sp>
+      <p:sp>
+        <p:nvSpPr>
+          <p:cNvPr id="53" name="Oval 52"/>
+          <p:cNvSpPr/>
+          <p:nvPr/>
+        </p:nvSpPr>
+        <p:spPr>
+          <a:xfrm>
+            <a:off x="2286000" y="2362200"/>
+            <a:ext cx="1524000" cy="914400"/>
+          </a:xfrm>
+          <a:prstGeom prst="ellipse">
+            <a:avLst/>
+          </a:prstGeom>
+        </p:spPr>
+        <p:style>
+          <a:lnRef idx="2">
+            <a:schemeClr val="accent1">
+              <a:shade val="50000"/>
+            </a:schemeClr>
+          </a:lnRef>
+          <a:fillRef idx="1">
+            <a:schemeClr val="accent1"/>
+          </a:fillRef>
+          <a:effectRef idx="0">
+            <a:schemeClr val="accent1"/>
+          </a:effectRef>
+          <a:fontRef idx="minor">
+            <a:schemeClr val="lt1"/>
+          </a:fontRef>
+        </p:style>
+        <p:txBody>
+          <a:bodyPr rtlCol="0" anchor="ctr"/>
+          <a:lstStyle/>
+          <a:p>
+            <a:pPr algn="ctr"/>
+            <a:r>
+              <a:rPr lang="en-US" dirty="0" smtClean="0"/>
+              <a:t>Khóa bí mật</a:t>
+            </a:r>
+            <a:endParaRPr lang="en-US" dirty="0"/>
+          </a:p>
+        </p:txBody>
+      </p:sp>
+      <p:sp>
+        <p:nvSpPr>
+          <p:cNvPr id="54" name="Oval 53"/>
+          <p:cNvSpPr/>
+          <p:nvPr/>
+        </p:nvSpPr>
+        <p:spPr>
+          <a:xfrm>
+            <a:off x="6019800" y="2286000"/>
+            <a:ext cx="1524000" cy="914400"/>
+          </a:xfrm>
+          <a:prstGeom prst="ellipse">
+            <a:avLst/>
+          </a:prstGeom>
+        </p:spPr>
+        <p:style>
+          <a:lnRef idx="2">
+            <a:schemeClr val="accent1">
+              <a:shade val="50000"/>
+            </a:schemeClr>
+          </a:lnRef>
+          <a:fillRef idx="1">
+            <a:schemeClr val="accent1"/>
+          </a:fillRef>
+          <a:effectRef idx="0">
+            <a:schemeClr val="accent1"/>
+          </a:effectRef>
+          <a:fontRef idx="minor">
+            <a:schemeClr val="lt1"/>
+          </a:fontRef>
+        </p:style>
+        <p:txBody>
+          <a:bodyPr rtlCol="0" anchor="ctr"/>
+          <a:lstStyle/>
+          <a:p>
+            <a:pPr algn="ctr"/>
+            <a:r>
+              <a:rPr lang="en-US" dirty="0" smtClean="0"/>
+              <a:t>Khóa bí mật</a:t>
+            </a:r>
+            <a:endParaRPr lang="en-US" dirty="0"/>
+          </a:p>
+        </p:txBody>
+      </p:sp>
+      <p:cxnSp>
+        <p:nvCxnSpPr>
+          <p:cNvPr id="56" name="Straight Arrow Connector 55"/>
+          <p:cNvCxnSpPr>
+            <a:endCxn id="48" idx="1"/>
+          </p:cNvCxnSpPr>
+          <p:nvPr/>
+        </p:nvCxnSpPr>
+        <p:spPr>
+          <a:xfrm>
+            <a:off x="5715000" y="914400"/>
+            <a:ext cx="457200" cy="266700"/>
+          </a:xfrm>
+          <a:prstGeom prst="straightConnector1">
+            <a:avLst/>
+          </a:prstGeom>
+          <a:ln>
+            <a:tailEnd type="arrow"/>
+          </a:ln>
+        </p:spPr>
+        <p:style>
+          <a:lnRef idx="2">
+            <a:schemeClr val="accent2"/>
+          </a:lnRef>
+          <a:fillRef idx="0">
+            <a:schemeClr val="accent2"/>
+          </a:fillRef>
+          <a:effectRef idx="1">
+            <a:schemeClr val="accent2"/>
+          </a:effectRef>
+          <a:fontRef idx="minor">
+            <a:schemeClr val="tx1"/>
+          </a:fontRef>
+        </p:style>
+      </p:cxnSp>
+      <p:cxnSp>
+        <p:nvCxnSpPr>
+          <p:cNvPr id="58" name="Straight Arrow Connector 57"/>
+          <p:cNvCxnSpPr>
+            <a:stCxn id="48" idx="3"/>
+            <a:endCxn id="6" idx="1"/>
+          </p:cNvCxnSpPr>
+          <p:nvPr/>
+        </p:nvCxnSpPr>
+        <p:spPr>
+          <a:xfrm>
+            <a:off x="7239000" y="1181100"/>
+            <a:ext cx="381000" cy="38100"/>
+          </a:xfrm>
+          <a:prstGeom prst="straightConnector1">
+            <a:avLst/>
+          </a:prstGeom>
+          <a:ln>
+            <a:tailEnd type="arrow"/>
+          </a:ln>
+        </p:spPr>
+        <p:style>
+          <a:lnRef idx="2">
+            <a:schemeClr val="accent2"/>
+          </a:lnRef>
+          <a:fillRef idx="0">
+            <a:schemeClr val="accent2"/>
+          </a:fillRef>
+          <a:effectRef idx="1">
+            <a:schemeClr val="accent2"/>
+          </a:effectRef>
+          <a:fontRef idx="minor">
+            <a:schemeClr val="tx1"/>
+          </a:fontRef>
+        </p:style>
+      </p:cxnSp>
+      <p:cxnSp>
+        <p:nvCxnSpPr>
+          <p:cNvPr id="65" name="Straight Connector 64"/>
+          <p:cNvCxnSpPr>
+            <a:stCxn id="53" idx="0"/>
+            <a:endCxn id="7" idx="2"/>
+          </p:cNvCxnSpPr>
+          <p:nvPr/>
+        </p:nvCxnSpPr>
+        <p:spPr>
+          <a:xfrm flipV="1">
+            <a:off x="3048000" y="1828800"/>
+            <a:ext cx="38100" cy="533400"/>
+          </a:xfrm>
+          <a:prstGeom prst="line">
+            <a:avLst/>
+          </a:prstGeom>
+        </p:spPr>
+        <p:style>
+          <a:lnRef idx="2">
+            <a:schemeClr val="accent2"/>
+          </a:lnRef>
+          <a:fillRef idx="0">
+            <a:schemeClr val="accent2"/>
+          </a:fillRef>
+          <a:effectRef idx="1">
+            <a:schemeClr val="accent2"/>
+          </a:effectRef>
+          <a:fontRef idx="minor">
+            <a:schemeClr val="tx1"/>
+          </a:fontRef>
+        </p:style>
+      </p:cxnSp>
+      <p:cxnSp>
+        <p:nvCxnSpPr>
+          <p:cNvPr id="67" name="Straight Connector 66"/>
+          <p:cNvCxnSpPr>
+            <a:stCxn id="54" idx="0"/>
+            <a:endCxn id="48" idx="2"/>
+          </p:cNvCxnSpPr>
+          <p:nvPr/>
+        </p:nvCxnSpPr>
+        <p:spPr>
+          <a:xfrm flipH="1" flipV="1">
+            <a:off x="6705600" y="1828800"/>
+            <a:ext cx="76200" cy="457200"/>
+          </a:xfrm>
+          <a:prstGeom prst="line">
+            <a:avLst/>
+          </a:prstGeom>
+        </p:spPr>
+        <p:style>
+          <a:lnRef idx="2">
+            <a:schemeClr val="accent2"/>
+          </a:lnRef>
+          <a:fillRef idx="0">
+            <a:schemeClr val="accent2"/>
+          </a:fillRef>
+          <a:effectRef idx="1">
+            <a:schemeClr val="accent2"/>
+          </a:effectRef>
+          <a:fontRef idx="minor">
+            <a:schemeClr val="tx1"/>
+          </a:fontRef>
+        </p:style>
+      </p:cxnSp>
     </p:spTree>
   </p:cSld>
   <p:clrMapOvr>

</xml_diff>